<commit_message>
adding links to slides
</commit_message>
<xml_diff>
--- a/slides.pptx
+++ b/slides.pptx
@@ -11,7 +11,8 @@
     <p:sldId id="259" r:id="rId5"/>
     <p:sldId id="260" r:id="rId6"/>
     <p:sldId id="261" r:id="rId7"/>
-    <p:sldId id="262" r:id="rId8"/>
+    <p:sldId id="263" r:id="rId8"/>
+    <p:sldId id="262" r:id="rId9"/>
   </p:sldIdLst>
   <p:sldSz cx="9144000" cy="6858000" type="screen4x3"/>
   <p:notesSz cx="6858000" cy="9144000"/>
@@ -6744,6 +6745,174 @@
           <a:p>
             <a:r>
               <a:rPr lang="en-US" dirty="0" smtClean="0"/>
+              <a:t>Further topics to explore	</a:t>
+            </a:r>
+            <a:endParaRPr lang="en-US" dirty="0"/>
+          </a:p>
+        </p:txBody>
+      </p:sp>
+      <p:sp>
+        <p:nvSpPr>
+          <p:cNvPr id="3" name="Content Placeholder 2"/>
+          <p:cNvSpPr>
+            <a:spLocks noGrp="1"/>
+          </p:cNvSpPr>
+          <p:nvPr>
+            <p:ph sz="quarter" idx="1"/>
+          </p:nvPr>
+        </p:nvSpPr>
+        <p:spPr/>
+        <p:txBody>
+          <a:bodyPr/>
+          <a:lstStyle/>
+          <a:p>
+            <a:r>
+              <a:rPr lang="en-US" dirty="0" smtClean="0"/>
+              <a:t>Debugging tests</a:t>
+            </a:r>
+          </a:p>
+          <a:p>
+            <a:pPr lvl="1"/>
+            <a:r>
+              <a:rPr lang="en-US" dirty="0"/>
+              <a:t>Pry - </a:t>
+            </a:r>
+            <a:r>
+              <a:rPr lang="en-US" dirty="0">
+                <a:hlinkClick r:id="rId2"/>
+              </a:rPr>
+              <a:t>http://pryrepl.org</a:t>
+            </a:r>
+            <a:r>
+              <a:rPr lang="en-US" dirty="0" smtClean="0">
+                <a:hlinkClick r:id="rId2"/>
+              </a:rPr>
+              <a:t>/</a:t>
+            </a:r>
+            <a:endParaRPr lang="en-US" dirty="0" smtClean="0"/>
+          </a:p>
+          <a:p>
+            <a:pPr lvl="1"/>
+            <a:r>
+              <a:rPr lang="en-US" dirty="0" smtClean="0"/>
+              <a:t>Pry-</a:t>
+            </a:r>
+            <a:r>
+              <a:rPr lang="en-US" dirty="0" err="1" smtClean="0"/>
+              <a:t>Byebug</a:t>
+            </a:r>
+            <a:r>
+              <a:rPr lang="en-US" dirty="0"/>
+              <a:t> - </a:t>
+            </a:r>
+            <a:r>
+              <a:rPr lang="en-US" dirty="0">
+                <a:hlinkClick r:id="rId3"/>
+              </a:rPr>
+              <a:t>https://github.com/deivid-rodriguez/pry-</a:t>
+            </a:r>
+            <a:r>
+              <a:rPr lang="en-US" dirty="0" smtClean="0">
+                <a:hlinkClick r:id="rId3"/>
+              </a:rPr>
+              <a:t>byebug</a:t>
+            </a:r>
+            <a:endParaRPr lang="en-US" dirty="0" smtClean="0"/>
+          </a:p>
+          <a:p>
+            <a:r>
+              <a:rPr lang="en-US" dirty="0" smtClean="0"/>
+              <a:t>More on Fixtures</a:t>
+            </a:r>
+          </a:p>
+          <a:p>
+            <a:pPr lvl="1"/>
+            <a:r>
+              <a:rPr lang="en-US" dirty="0">
+                <a:hlinkClick r:id="rId4"/>
+              </a:rPr>
+              <a:t>http://api.rubyonrails.org/v3.2.8/classes/ActiveRecord/</a:t>
+            </a:r>
+            <a:r>
+              <a:rPr lang="en-US" dirty="0" smtClean="0">
+                <a:hlinkClick r:id="rId4"/>
+              </a:rPr>
+              <a:t>Fixtures.html</a:t>
+            </a:r>
+            <a:endParaRPr lang="en-US" dirty="0" smtClean="0"/>
+          </a:p>
+          <a:p>
+            <a:r>
+              <a:rPr lang="en-US" dirty="0" smtClean="0"/>
+              <a:t>Controller tests</a:t>
+            </a:r>
+          </a:p>
+          <a:p>
+            <a:pPr lvl="1"/>
+            <a:r>
+              <a:rPr lang="en-US" dirty="0">
+                <a:hlinkClick r:id="rId5"/>
+              </a:rPr>
+              <a:t>https://github.com/metaskills/minitest-spec-rails</a:t>
+            </a:r>
+            <a:endParaRPr lang="en-US" dirty="0"/>
+          </a:p>
+          <a:p>
+            <a:endParaRPr lang="en-US" dirty="0" smtClean="0"/>
+          </a:p>
+          <a:p>
+            <a:pPr lvl="1"/>
+            <a:endParaRPr lang="en-US" dirty="0" smtClean="0"/>
+          </a:p>
+        </p:txBody>
+      </p:sp>
+    </p:spTree>
+    <p:extLst>
+      <p:ext uri="{BB962C8B-B14F-4D97-AF65-F5344CB8AC3E}">
+        <p14:creationId xmlns:p14="http://schemas.microsoft.com/office/powerpoint/2010/main" val="3689023483"/>
+      </p:ext>
+    </p:extLst>
+  </p:cSld>
+  <p:clrMapOvr>
+    <a:masterClrMapping/>
+  </p:clrMapOvr>
+</p:sld>
+</file>
+
+<file path=ppt/slides/slide8.xml><?xml version="1.0" encoding="utf-8"?>
+<p:sld xmlns:a="http://schemas.openxmlformats.org/drawingml/2006/main" xmlns:r="http://schemas.openxmlformats.org/officeDocument/2006/relationships" xmlns:p="http://schemas.openxmlformats.org/presentationml/2006/main">
+  <p:cSld>
+    <p:spTree>
+      <p:nvGrpSpPr>
+        <p:cNvPr id="1" name=""/>
+        <p:cNvGrpSpPr/>
+        <p:nvPr/>
+      </p:nvGrpSpPr>
+      <p:grpSpPr>
+        <a:xfrm>
+          <a:off x="0" y="0"/>
+          <a:ext cx="0" cy="0"/>
+          <a:chOff x="0" y="0"/>
+          <a:chExt cx="0" cy="0"/>
+        </a:xfrm>
+      </p:grpSpPr>
+      <p:sp>
+        <p:nvSpPr>
+          <p:cNvPr id="2" name="Title 1"/>
+          <p:cNvSpPr>
+            <a:spLocks noGrp="1"/>
+          </p:cNvSpPr>
+          <p:nvPr>
+            <p:ph type="title"/>
+          </p:nvPr>
+        </p:nvSpPr>
+        <p:spPr/>
+        <p:txBody>
+          <a:bodyPr/>
+          <a:lstStyle/>
+          <a:p>
+            <a:r>
+              <a:rPr lang="en-US" dirty="0" smtClean="0"/>
               <a:t>Links</a:t>
             </a:r>
             <a:endParaRPr lang="en-US" dirty="0"/>
@@ -6784,24 +6953,18 @@
               <a:rPr lang="en-US" dirty="0">
                 <a:hlinkClick r:id="rId3"/>
               </a:rPr>
-              <a:t>https://github.com/AndrewSwerlick/tdd</a:t>
-            </a:r>
-            <a:r>
-              <a:rPr lang="en-US">
-                <a:hlinkClick r:id="rId3"/>
-              </a:rPr>
-              <a:t>-</a:t>
-            </a:r>
-            <a:r>
-              <a:rPr lang="en-US" smtClean="0">
+              <a:t>https://github.com/AndrewSwerlick/tdd-</a:t>
+            </a:r>
+            <a:r>
+              <a:rPr lang="en-US" dirty="0" smtClean="0">
                 <a:hlinkClick r:id="rId3"/>
               </a:rPr>
               <a:t>demo</a:t>
             </a:r>
-            <a:endParaRPr lang="en-US" smtClean="0"/>
-          </a:p>
-          <a:p>
-            <a:endParaRPr lang="en-US"/>
+            <a:endParaRPr lang="en-US" dirty="0" smtClean="0"/>
+          </a:p>
+          <a:p>
+            <a:endParaRPr lang="en-US" dirty="0"/>
           </a:p>
         </p:txBody>
       </p:sp>

</xml_diff>

<commit_message>
adding information about me to deck
</commit_message>
<xml_diff>
--- a/slides.pptx
+++ b/slides.pptx
@@ -6117,6 +6117,78 @@
           <a:xfrm>
             <a:off x="5204731" y="1045211"/>
             <a:ext cx="1562100" cy="1117600"/>
+          </a:xfrm>
+          <a:prstGeom prst="rect">
+            <a:avLst/>
+          </a:prstGeom>
+        </p:spPr>
+      </p:pic>
+      <p:sp>
+        <p:nvSpPr>
+          <p:cNvPr id="5" name="TextBox 4"/>
+          <p:cNvSpPr txBox="1"/>
+          <p:nvPr/>
+        </p:nvSpPr>
+        <p:spPr>
+          <a:xfrm>
+            <a:off x="1282700" y="4876800"/>
+            <a:ext cx="6489700" cy="923330"/>
+          </a:xfrm>
+          <a:prstGeom prst="rect">
+            <a:avLst/>
+          </a:prstGeom>
+          <a:noFill/>
+        </p:spPr>
+        <p:txBody>
+          <a:bodyPr wrap="square" rtlCol="0">
+            <a:spAutoFit/>
+          </a:bodyPr>
+          <a:lstStyle/>
+          <a:p>
+            <a:r>
+              <a:rPr lang="en-US" dirty="0" smtClean="0"/>
+              <a:t>Andrew Swerlick</a:t>
+            </a:r>
+          </a:p>
+          <a:p>
+            <a:r>
+              <a:rPr lang="en-US" dirty="0" smtClean="0"/>
+              <a:t>Senior Software Engineer</a:t>
+            </a:r>
+          </a:p>
+          <a:p>
+            <a:r>
+              <a:rPr lang="en-US" dirty="0" smtClean="0"/>
+              <a:t>Herrmann International </a:t>
+            </a:r>
+            <a:endParaRPr lang="en-US" dirty="0"/>
+          </a:p>
+        </p:txBody>
+      </p:sp>
+      <p:pic>
+        <p:nvPicPr>
+          <p:cNvPr id="6" name="Picture 5" descr="transparent_masthead_logo.gif"/>
+          <p:cNvPicPr>
+            <a:picLocks noChangeAspect="1"/>
+          </p:cNvPicPr>
+          <p:nvPr/>
+        </p:nvPicPr>
+        <p:blipFill>
+          <a:blip r:embed="rId3">
+            <a:extLst>
+              <a:ext uri="{28A0092B-C50C-407E-A947-70E740481C1C}">
+                <a14:useLocalDpi xmlns:a14="http://schemas.microsoft.com/office/drawing/2010/main" val="0"/>
+              </a:ext>
+            </a:extLst>
+          </a:blip>
+          <a:stretch>
+            <a:fillRect/>
+          </a:stretch>
+        </p:blipFill>
+        <p:spPr>
+          <a:xfrm>
+            <a:off x="5499100" y="4784130"/>
+            <a:ext cx="2946400" cy="1016000"/>
           </a:xfrm>
           <a:prstGeom prst="rect">
             <a:avLst/>

</xml_diff>